<commit_message>
got parsing titles working
</commit_message>
<xml_diff>
--- a/spec/fixtures/rime.pptx
+++ b/spec/fixtures/rime.pptx
@@ -10,7 +10,10 @@
     <p:sldId id="258" r:id="rId4"/>
     <p:sldId id="259" r:id="rId5"/>
     <p:sldId id="260" r:id="rId6"/>
-    <p:sldId id="261" r:id="rId7"/>
+    <p:sldId id="262" r:id="rId7"/>
+    <p:sldId id="263" r:id="rId8"/>
+    <p:sldId id="264" r:id="rId9"/>
+    <p:sldId id="261" r:id="rId10"/>
   </p:sldIdLst>
   <p:sldSz cx="9144000" cy="6858000" type="screen4x3"/>
   <p:notesSz cx="6858000" cy="9144000"/>
@@ -112,6 +115,299 @@
 </p:presentation>
 </file>
 
+<file path=ppt/charts/chart1.xml><?xml version="1.0" encoding="utf-8"?>
+<c:chartSpace xmlns:c="http://schemas.openxmlformats.org/drawingml/2006/chart" xmlns:a="http://schemas.openxmlformats.org/drawingml/2006/main" xmlns:r="http://schemas.openxmlformats.org/officeDocument/2006/relationships">
+  <c:date1904 val="0"/>
+  <c:lang val="en-US"/>
+  <c:roundedCorners val="0"/>
+  <mc:AlternateContent xmlns:mc="http://schemas.openxmlformats.org/markup-compatibility/2006">
+    <mc:Choice xmlns:c14="http://schemas.microsoft.com/office/drawing/2007/8/2/chart" Requires="c14">
+      <c14:style val="118"/>
+    </mc:Choice>
+    <mc:Fallback>
+      <c:style val="18"/>
+    </mc:Fallback>
+  </mc:AlternateContent>
+  <c:chart>
+    <c:title>
+      <c:tx>
+        <c:rich>
+          <a:bodyPr/>
+          <a:lstStyle/>
+          <a:p>
+            <a:pPr>
+              <a:defRPr/>
+            </a:pPr>
+            <a:r>
+              <a:rPr lang="en-US" dirty="0" smtClean="0"/>
+              <a:t>Let’s</a:t>
+            </a:r>
+            <a:r>
+              <a:rPr lang="en-US" baseline="0" dirty="0" smtClean="0"/>
+              <a:t> make sure we’re not going to get confused by chart titles</a:t>
+            </a:r>
+            <a:endParaRPr lang="en-US" dirty="0"/>
+          </a:p>
+        </c:rich>
+      </c:tx>
+      <c:layout/>
+      <c:overlay val="0"/>
+    </c:title>
+    <c:autoTitleDeleted val="0"/>
+    <c:plotArea>
+      <c:layout/>
+      <c:barChart>
+        <c:barDir val="col"/>
+        <c:grouping val="stacked"/>
+        <c:varyColors val="0"/>
+        <c:ser>
+          <c:idx val="0"/>
+          <c:order val="0"/>
+          <c:tx>
+            <c:strRef>
+              <c:f>Sheet1!$B$1</c:f>
+              <c:strCache>
+                <c:ptCount val="1"/>
+                <c:pt idx="0">
+                  <c:v>Series 1</c:v>
+                </c:pt>
+              </c:strCache>
+            </c:strRef>
+          </c:tx>
+          <c:invertIfNegative val="0"/>
+          <c:cat>
+            <c:strRef>
+              <c:f>Sheet1!$A$2:$A$5</c:f>
+              <c:strCache>
+                <c:ptCount val="4"/>
+                <c:pt idx="0">
+                  <c:v>Category 1</c:v>
+                </c:pt>
+                <c:pt idx="1">
+                  <c:v>Category 2</c:v>
+                </c:pt>
+                <c:pt idx="2">
+                  <c:v>Category 3</c:v>
+                </c:pt>
+                <c:pt idx="3">
+                  <c:v>Category 4</c:v>
+                </c:pt>
+              </c:strCache>
+            </c:strRef>
+          </c:cat>
+          <c:val>
+            <c:numRef>
+              <c:f>Sheet1!$B$2:$B$5</c:f>
+              <c:numCache>
+                <c:formatCode>General</c:formatCode>
+                <c:ptCount val="4"/>
+                <c:pt idx="0">
+                  <c:v>4.3</c:v>
+                </c:pt>
+                <c:pt idx="1">
+                  <c:v>2.5</c:v>
+                </c:pt>
+                <c:pt idx="2">
+                  <c:v>3.5</c:v>
+                </c:pt>
+                <c:pt idx="3">
+                  <c:v>4.5</c:v>
+                </c:pt>
+              </c:numCache>
+            </c:numRef>
+          </c:val>
+        </c:ser>
+        <c:ser>
+          <c:idx val="1"/>
+          <c:order val="1"/>
+          <c:tx>
+            <c:strRef>
+              <c:f>Sheet1!$C$1</c:f>
+              <c:strCache>
+                <c:ptCount val="1"/>
+                <c:pt idx="0">
+                  <c:v>Series 2</c:v>
+                </c:pt>
+              </c:strCache>
+            </c:strRef>
+          </c:tx>
+          <c:invertIfNegative val="0"/>
+          <c:cat>
+            <c:strRef>
+              <c:f>Sheet1!$A$2:$A$5</c:f>
+              <c:strCache>
+                <c:ptCount val="4"/>
+                <c:pt idx="0">
+                  <c:v>Category 1</c:v>
+                </c:pt>
+                <c:pt idx="1">
+                  <c:v>Category 2</c:v>
+                </c:pt>
+                <c:pt idx="2">
+                  <c:v>Category 3</c:v>
+                </c:pt>
+                <c:pt idx="3">
+                  <c:v>Category 4</c:v>
+                </c:pt>
+              </c:strCache>
+            </c:strRef>
+          </c:cat>
+          <c:val>
+            <c:numRef>
+              <c:f>Sheet1!$C$2:$C$5</c:f>
+              <c:numCache>
+                <c:formatCode>General</c:formatCode>
+                <c:ptCount val="4"/>
+                <c:pt idx="0">
+                  <c:v>2.4</c:v>
+                </c:pt>
+                <c:pt idx="1">
+                  <c:v>4.4</c:v>
+                </c:pt>
+                <c:pt idx="2">
+                  <c:v>1.8</c:v>
+                </c:pt>
+                <c:pt idx="3">
+                  <c:v>2.8</c:v>
+                </c:pt>
+              </c:numCache>
+            </c:numRef>
+          </c:val>
+        </c:ser>
+        <c:ser>
+          <c:idx val="2"/>
+          <c:order val="2"/>
+          <c:tx>
+            <c:strRef>
+              <c:f>Sheet1!$D$1</c:f>
+              <c:strCache>
+                <c:ptCount val="1"/>
+                <c:pt idx="0">
+                  <c:v>Series 3</c:v>
+                </c:pt>
+              </c:strCache>
+            </c:strRef>
+          </c:tx>
+          <c:invertIfNegative val="0"/>
+          <c:cat>
+            <c:strRef>
+              <c:f>Sheet1!$A$2:$A$5</c:f>
+              <c:strCache>
+                <c:ptCount val="4"/>
+                <c:pt idx="0">
+                  <c:v>Category 1</c:v>
+                </c:pt>
+                <c:pt idx="1">
+                  <c:v>Category 2</c:v>
+                </c:pt>
+                <c:pt idx="2">
+                  <c:v>Category 3</c:v>
+                </c:pt>
+                <c:pt idx="3">
+                  <c:v>Category 4</c:v>
+                </c:pt>
+              </c:strCache>
+            </c:strRef>
+          </c:cat>
+          <c:val>
+            <c:numRef>
+              <c:f>Sheet1!$D$2:$D$5</c:f>
+              <c:numCache>
+                <c:formatCode>General</c:formatCode>
+                <c:ptCount val="4"/>
+                <c:pt idx="0">
+                  <c:v>2.0</c:v>
+                </c:pt>
+                <c:pt idx="1">
+                  <c:v>2.0</c:v>
+                </c:pt>
+                <c:pt idx="2">
+                  <c:v>3.0</c:v>
+                </c:pt>
+                <c:pt idx="3">
+                  <c:v>5.0</c:v>
+                </c:pt>
+              </c:numCache>
+            </c:numRef>
+          </c:val>
+        </c:ser>
+        <c:dLbls>
+          <c:showLegendKey val="0"/>
+          <c:showVal val="0"/>
+          <c:showCatName val="0"/>
+          <c:showSerName val="0"/>
+          <c:showPercent val="0"/>
+          <c:showBubbleSize val="0"/>
+        </c:dLbls>
+        <c:gapWidth val="75"/>
+        <c:overlap val="100"/>
+        <c:axId val="-2118356776"/>
+        <c:axId val="-2115901576"/>
+      </c:barChart>
+      <c:catAx>
+        <c:axId val="-2118356776"/>
+        <c:scaling>
+          <c:orientation val="minMax"/>
+        </c:scaling>
+        <c:delete val="0"/>
+        <c:axPos val="b"/>
+        <c:majorTickMark val="none"/>
+        <c:minorTickMark val="none"/>
+        <c:tickLblPos val="nextTo"/>
+        <c:crossAx val="-2115901576"/>
+        <c:crosses val="autoZero"/>
+        <c:auto val="1"/>
+        <c:lblAlgn val="ctr"/>
+        <c:lblOffset val="100"/>
+        <c:noMultiLvlLbl val="0"/>
+      </c:catAx>
+      <c:valAx>
+        <c:axId val="-2115901576"/>
+        <c:scaling>
+          <c:orientation val="minMax"/>
+        </c:scaling>
+        <c:delete val="0"/>
+        <c:axPos val="l"/>
+        <c:majorGridlines/>
+        <c:numFmt formatCode="General" sourceLinked="1"/>
+        <c:majorTickMark val="none"/>
+        <c:minorTickMark val="none"/>
+        <c:tickLblPos val="nextTo"/>
+        <c:spPr>
+          <a:ln w="9525">
+            <a:noFill/>
+          </a:ln>
+        </c:spPr>
+        <c:crossAx val="-2118356776"/>
+        <c:crosses val="autoZero"/>
+        <c:crossBetween val="between"/>
+      </c:valAx>
+    </c:plotArea>
+    <c:legend>
+      <c:legendPos val="b"/>
+      <c:layout/>
+      <c:overlay val="0"/>
+    </c:legend>
+    <c:plotVisOnly val="1"/>
+    <c:dispBlanksAs val="gap"/>
+    <c:showDLblsOverMax val="0"/>
+  </c:chart>
+  <c:txPr>
+    <a:bodyPr/>
+    <a:lstStyle/>
+    <a:p>
+      <a:pPr>
+        <a:defRPr sz="1800"/>
+      </a:pPr>
+      <a:endParaRPr lang="en-US"/>
+    </a:p>
+  </c:txPr>
+  <c:externalData r:id="rId1">
+    <c:autoUpdate val="0"/>
+  </c:externalData>
+</c:chartSpace>
+</file>
+
 <file path=ppt/slideLayouts/slideLayout1.xml><?xml version="1.0" encoding="utf-8"?>
 <p:sldLayout xmlns:a="http://schemas.openxmlformats.org/drawingml/2006/main" xmlns:r="http://schemas.openxmlformats.org/officeDocument/2006/relationships" xmlns:p="http://schemas.openxmlformats.org/presentationml/2006/main" type="title" preserve="1">
   <p:cSld name="Title Slide">
@@ -293,7 +589,7 @@
           <a:p>
             <a:fld id="{E7A90B90-E472-474B-A3B5-1621A993C8E6}" type="datetimeFigureOut">
               <a:rPr lang="en-US" smtClean="0"/>
-              <a:t>2/14/14</a:t>
+              <a:t>3/1/14</a:t>
             </a:fld>
             <a:endParaRPr lang="en-US"/>
           </a:p>
@@ -463,7 +759,7 @@
           <a:p>
             <a:fld id="{E7A90B90-E472-474B-A3B5-1621A993C8E6}" type="datetimeFigureOut">
               <a:rPr lang="en-US" smtClean="0"/>
-              <a:t>2/14/14</a:t>
+              <a:t>3/1/14</a:t>
             </a:fld>
             <a:endParaRPr lang="en-US"/>
           </a:p>
@@ -643,7 +939,7 @@
           <a:p>
             <a:fld id="{E7A90B90-E472-474B-A3B5-1621A993C8E6}" type="datetimeFigureOut">
               <a:rPr lang="en-US" smtClean="0"/>
-              <a:t>2/14/14</a:t>
+              <a:t>3/1/14</a:t>
             </a:fld>
             <a:endParaRPr lang="en-US"/>
           </a:p>
@@ -813,7 +1109,7 @@
           <a:p>
             <a:fld id="{E7A90B90-E472-474B-A3B5-1621A993C8E6}" type="datetimeFigureOut">
               <a:rPr lang="en-US" smtClean="0"/>
-              <a:t>2/14/14</a:t>
+              <a:t>3/1/14</a:t>
             </a:fld>
             <a:endParaRPr lang="en-US"/>
           </a:p>
@@ -1059,7 +1355,7 @@
           <a:p>
             <a:fld id="{E7A90B90-E472-474B-A3B5-1621A993C8E6}" type="datetimeFigureOut">
               <a:rPr lang="en-US" smtClean="0"/>
-              <a:t>2/14/14</a:t>
+              <a:t>3/1/14</a:t>
             </a:fld>
             <a:endParaRPr lang="en-US"/>
           </a:p>
@@ -1347,7 +1643,7 @@
           <a:p>
             <a:fld id="{E7A90B90-E472-474B-A3B5-1621A993C8E6}" type="datetimeFigureOut">
               <a:rPr lang="en-US" smtClean="0"/>
-              <a:t>2/14/14</a:t>
+              <a:t>3/1/14</a:t>
             </a:fld>
             <a:endParaRPr lang="en-US"/>
           </a:p>
@@ -1769,7 +2065,7 @@
           <a:p>
             <a:fld id="{E7A90B90-E472-474B-A3B5-1621A993C8E6}" type="datetimeFigureOut">
               <a:rPr lang="en-US" smtClean="0"/>
-              <a:t>2/14/14</a:t>
+              <a:t>3/1/14</a:t>
             </a:fld>
             <a:endParaRPr lang="en-US"/>
           </a:p>
@@ -1887,7 +2183,7 @@
           <a:p>
             <a:fld id="{E7A90B90-E472-474B-A3B5-1621A993C8E6}" type="datetimeFigureOut">
               <a:rPr lang="en-US" smtClean="0"/>
-              <a:t>2/14/14</a:t>
+              <a:t>3/1/14</a:t>
             </a:fld>
             <a:endParaRPr lang="en-US"/>
           </a:p>
@@ -1982,7 +2278,7 @@
           <a:p>
             <a:fld id="{E7A90B90-E472-474B-A3B5-1621A993C8E6}" type="datetimeFigureOut">
               <a:rPr lang="en-US" smtClean="0"/>
-              <a:t>2/14/14</a:t>
+              <a:t>3/1/14</a:t>
             </a:fld>
             <a:endParaRPr lang="en-US"/>
           </a:p>
@@ -2259,7 +2555,7 @@
           <a:p>
             <a:fld id="{E7A90B90-E472-474B-A3B5-1621A993C8E6}" type="datetimeFigureOut">
               <a:rPr lang="en-US" smtClean="0"/>
-              <a:t>2/14/14</a:t>
+              <a:t>3/1/14</a:t>
             </a:fld>
             <a:endParaRPr lang="en-US"/>
           </a:p>
@@ -2512,7 +2808,7 @@
           <a:p>
             <a:fld id="{E7A90B90-E472-474B-A3B5-1621A993C8E6}" type="datetimeFigureOut">
               <a:rPr lang="en-US" smtClean="0"/>
-              <a:t>2/14/14</a:t>
+              <a:t>3/1/14</a:t>
             </a:fld>
             <a:endParaRPr lang="en-US"/>
           </a:p>
@@ -2725,7 +3021,7 @@
           <a:p>
             <a:fld id="{E7A90B90-E472-474B-A3B5-1621A993C8E6}" type="datetimeFigureOut">
               <a:rPr lang="en-US" smtClean="0"/>
-              <a:t>2/14/14</a:t>
+              <a:t>3/1/14</a:t>
             </a:fld>
             <a:endParaRPr lang="en-US"/>
           </a:p>
@@ -5069,6 +5365,120 @@
       </p:grpSpPr>
       <p:sp>
         <p:nvSpPr>
+          <p:cNvPr id="3" name="Content Placeholder 2"/>
+          <p:cNvSpPr>
+            <a:spLocks noGrp="1"/>
+          </p:cNvSpPr>
+          <p:nvPr>
+            <p:ph idx="1"/>
+          </p:nvPr>
+        </p:nvSpPr>
+        <p:spPr/>
+        <p:txBody>
+          <a:bodyPr/>
+          <a:lstStyle/>
+          <a:p>
+            <a:r>
+              <a:rPr lang="en-US" dirty="0" smtClean="0"/>
+              <a:t>How about a slide with no title?</a:t>
+            </a:r>
+          </a:p>
+          <a:p>
+            <a:r>
+              <a:rPr lang="en-US" dirty="0" smtClean="0"/>
+              <a:t>Just bullets?</a:t>
+            </a:r>
+            <a:endParaRPr lang="en-US" dirty="0"/>
+          </a:p>
+        </p:txBody>
+      </p:sp>
+    </p:spTree>
+    <p:extLst>
+      <p:ext uri="{BB962C8B-B14F-4D97-AF65-F5344CB8AC3E}">
+        <p14:creationId xmlns:p14="http://schemas.microsoft.com/office/powerpoint/2010/main" val="3469838714"/>
+      </p:ext>
+    </p:extLst>
+  </p:cSld>
+  <p:clrMapOvr>
+    <a:masterClrMapping/>
+  </p:clrMapOvr>
+</p:sld>
+</file>
+
+<file path=ppt/slides/slide7.xml><?xml version="1.0" encoding="utf-8"?>
+<p:sld xmlns:a="http://schemas.openxmlformats.org/drawingml/2006/main" xmlns:r="http://schemas.openxmlformats.org/officeDocument/2006/relationships" xmlns:p="http://schemas.openxmlformats.org/presentationml/2006/main">
+  <p:cSld>
+    <p:spTree>
+      <p:nvGrpSpPr>
+        <p:cNvPr id="1" name=""/>
+        <p:cNvGrpSpPr/>
+        <p:nvPr/>
+      </p:nvGrpSpPr>
+      <p:grpSpPr>
+        <a:xfrm>
+          <a:off x="0" y="0"/>
+          <a:ext cx="0" cy="0"/>
+          <a:chOff x="0" y="0"/>
+          <a:chExt cx="0" cy="0"/>
+        </a:xfrm>
+      </p:grpSpPr>
+      <p:graphicFrame>
+        <p:nvGraphicFramePr>
+          <p:cNvPr id="4" name="Content Placeholder 3"/>
+          <p:cNvGraphicFramePr>
+            <a:graphicFrameLocks noGrp="1"/>
+          </p:cNvGraphicFramePr>
+          <p:nvPr>
+            <p:ph idx="1"/>
+            <p:extLst>
+              <p:ext uri="{D42A27DB-BD31-4B8C-83A1-F6EECF244321}">
+                <p14:modId xmlns:p14="http://schemas.microsoft.com/office/powerpoint/2010/main" val="1398556317"/>
+              </p:ext>
+            </p:extLst>
+          </p:nvPr>
+        </p:nvGraphicFramePr>
+        <p:xfrm>
+          <a:off x="457200" y="1600200"/>
+          <a:ext cx="8229600" cy="4525963"/>
+        </p:xfrm>
+        <a:graphic>
+          <a:graphicData uri="http://schemas.openxmlformats.org/drawingml/2006/chart">
+            <c:chart xmlns:c="http://schemas.openxmlformats.org/drawingml/2006/chart" xmlns:r="http://schemas.openxmlformats.org/officeDocument/2006/relationships" r:id="rId2"/>
+          </a:graphicData>
+        </a:graphic>
+      </p:graphicFrame>
+    </p:spTree>
+    <p:extLst>
+      <p:ext uri="{BB962C8B-B14F-4D97-AF65-F5344CB8AC3E}">
+        <p14:creationId xmlns:p14="http://schemas.microsoft.com/office/powerpoint/2010/main" val="325934680"/>
+      </p:ext>
+    </p:extLst>
+  </p:cSld>
+  <p:clrMapOvr>
+    <a:masterClrMapping/>
+  </p:clrMapOvr>
+</p:sld>
+</file>
+
+<file path=ppt/slides/slide8.xml><?xml version="1.0" encoding="utf-8"?>
+<p:sld xmlns:a="http://schemas.openxmlformats.org/drawingml/2006/main" xmlns:r="http://schemas.openxmlformats.org/officeDocument/2006/relationships" xmlns:p="http://schemas.openxmlformats.org/presentationml/2006/main">
+  <p:cSld>
+    <p:spTree>
+      <p:nvGrpSpPr>
+        <p:cNvPr id="1" name=""/>
+        <p:cNvGrpSpPr/>
+        <p:nvPr/>
+      </p:nvGrpSpPr>
+      <p:grpSpPr>
+        <a:xfrm>
+          <a:off x="0" y="0"/>
+          <a:ext cx="0" cy="0"/>
+          <a:chOff x="0" y="0"/>
+          <a:chExt cx="0" cy="0"/>
+        </a:xfrm>
+      </p:grpSpPr>
+      <p:sp>
+        <p:nvSpPr>
           <p:cNvPr id="2" name="Title 1"/>
           <p:cNvSpPr>
             <a:spLocks noGrp="1"/>
@@ -5084,7 +5494,146 @@
           <a:p>
             <a:r>
               <a:rPr lang="en-US" dirty="0" smtClean="0"/>
-              <a:t>There’s more…</a:t>
+              <a:t>What if we have two</a:t>
+            </a:r>
+            <a:endParaRPr lang="en-US" dirty="0"/>
+          </a:p>
+        </p:txBody>
+      </p:sp>
+      <p:sp>
+        <p:nvSpPr>
+          <p:cNvPr id="3" name="Content Placeholder 2"/>
+          <p:cNvSpPr>
+            <a:spLocks noGrp="1"/>
+          </p:cNvSpPr>
+          <p:nvPr>
+            <p:ph idx="1"/>
+          </p:nvPr>
+        </p:nvSpPr>
+        <p:spPr>
+          <a:xfrm>
+            <a:off x="457200" y="3445504"/>
+            <a:ext cx="8229600" cy="2680659"/>
+          </a:xfrm>
+        </p:spPr>
+        <p:txBody>
+          <a:bodyPr/>
+          <a:lstStyle/>
+          <a:p>
+            <a:r>
+              <a:rPr lang="en-US" dirty="0" smtClean="0"/>
+              <a:t>It’s not really two titles— OOXML only gives the first one the title attribute, even though you’d never know that as an end user since they basically look the same in </a:t>
+            </a:r>
+            <a:r>
+              <a:rPr lang="en-US" smtClean="0"/>
+              <a:t>Powerpoint</a:t>
+            </a:r>
+            <a:endParaRPr lang="en-US" dirty="0"/>
+          </a:p>
+        </p:txBody>
+      </p:sp>
+      <p:sp>
+        <p:nvSpPr>
+          <p:cNvPr id="4" name="Title 1"/>
+          <p:cNvSpPr txBox="1">
+            <a:spLocks/>
+          </p:cNvSpPr>
+          <p:nvPr/>
+        </p:nvSpPr>
+        <p:spPr>
+          <a:xfrm>
+            <a:off x="457200" y="1600200"/>
+            <a:ext cx="8229600" cy="1143000"/>
+          </a:xfrm>
+          <a:prstGeom prst="rect">
+            <a:avLst/>
+          </a:prstGeom>
+        </p:spPr>
+        <p:txBody>
+          <a:bodyPr vert="horz" lIns="91440" tIns="45720" rIns="91440" bIns="45720" rtlCol="0" anchor="ctr">
+            <a:normAutofit/>
+          </a:bodyPr>
+          <a:lstStyle>
+            <a:lvl1pPr algn="ctr" defTabSz="457200" rtl="0" eaLnBrk="1" latinLnBrk="0" hangingPunct="1">
+              <a:spcBef>
+                <a:spcPct val="0"/>
+              </a:spcBef>
+              <a:buNone/>
+              <a:defRPr sz="4400" kern="1200">
+                <a:solidFill>
+                  <a:schemeClr val="tx1"/>
+                </a:solidFill>
+                <a:latin typeface="+mj-lt"/>
+                <a:ea typeface="+mj-ea"/>
+                <a:cs typeface="+mj-cs"/>
+              </a:defRPr>
+            </a:lvl1pPr>
+          </a:lstStyle>
+          <a:p>
+            <a:r>
+              <a:rPr lang="en-US" dirty="0" smtClean="0"/>
+              <a:t>Titles?</a:t>
+            </a:r>
+            <a:endParaRPr lang="en-US" dirty="0"/>
+          </a:p>
+        </p:txBody>
+      </p:sp>
+    </p:spTree>
+    <p:extLst>
+      <p:ext uri="{BB962C8B-B14F-4D97-AF65-F5344CB8AC3E}">
+        <p14:creationId xmlns:p14="http://schemas.microsoft.com/office/powerpoint/2010/main" val="4155182941"/>
+      </p:ext>
+    </p:extLst>
+  </p:cSld>
+  <p:clrMapOvr>
+    <a:masterClrMapping/>
+  </p:clrMapOvr>
+</p:sld>
+</file>
+
+<file path=ppt/slides/slide9.xml><?xml version="1.0" encoding="utf-8"?>
+<p:sld xmlns:a="http://schemas.openxmlformats.org/drawingml/2006/main" xmlns:r="http://schemas.openxmlformats.org/officeDocument/2006/relationships" xmlns:p="http://schemas.openxmlformats.org/presentationml/2006/main">
+  <p:cSld>
+    <p:spTree>
+      <p:nvGrpSpPr>
+        <p:cNvPr id="1" name=""/>
+        <p:cNvGrpSpPr/>
+        <p:nvPr/>
+      </p:nvGrpSpPr>
+      <p:grpSpPr>
+        <a:xfrm>
+          <a:off x="0" y="0"/>
+          <a:ext cx="0" cy="0"/>
+          <a:chOff x="0" y="0"/>
+          <a:chExt cx="0" cy="0"/>
+        </a:xfrm>
+      </p:grpSpPr>
+      <p:sp>
+        <p:nvSpPr>
+          <p:cNvPr id="2" name="Title 1"/>
+          <p:cNvSpPr>
+            <a:spLocks noGrp="1"/>
+          </p:cNvSpPr>
+          <p:nvPr>
+            <p:ph type="title"/>
+          </p:nvPr>
+        </p:nvSpPr>
+        <p:spPr/>
+        <p:txBody>
+          <a:bodyPr/>
+          <a:lstStyle/>
+          <a:p>
+            <a:r>
+              <a:rPr lang="en-US" dirty="0" smtClean="0"/>
+              <a:t>There</a:t>
+            </a:r>
+            <a:r>
+              <a:rPr lang="fr-FR" dirty="0"/>
+              <a:t>'</a:t>
+            </a:r>
+            <a:r>
+              <a:rPr lang="en-US" smtClean="0"/>
+              <a:t>s more</a:t>
             </a:r>
             <a:endParaRPr lang="en-US" dirty="0"/>
           </a:p>

</xml_diff>

<commit_message>
new test deck to expose the > 10 slide alphanumeric sorting problem
the old test deck didn't show the sorting error it should have
</commit_message>
<xml_diff>
--- a/spec/fixtures/rime.pptx
+++ b/spec/fixtures/rime.pptx
@@ -14,6 +14,9 @@
     <p:sldId id="263" r:id="rId8"/>
     <p:sldId id="264" r:id="rId9"/>
     <p:sldId id="261" r:id="rId10"/>
+    <p:sldId id="265" r:id="rId11"/>
+    <p:sldId id="266" r:id="rId12"/>
+    <p:sldId id="267" r:id="rId13"/>
   </p:sldIdLst>
   <p:sldSz cx="9144000" cy="6858000" type="screen4x3"/>
   <p:notesSz cx="6858000" cy="9144000"/>
@@ -341,11 +344,11 @@
         </c:dLbls>
         <c:gapWidth val="75"/>
         <c:overlap val="100"/>
-        <c:axId val="-2118356776"/>
-        <c:axId val="-2115901576"/>
+        <c:axId val="2107362232"/>
+        <c:axId val="2107365256"/>
       </c:barChart>
       <c:catAx>
-        <c:axId val="-2118356776"/>
+        <c:axId val="2107362232"/>
         <c:scaling>
           <c:orientation val="minMax"/>
         </c:scaling>
@@ -354,7 +357,7 @@
         <c:majorTickMark val="none"/>
         <c:minorTickMark val="none"/>
         <c:tickLblPos val="nextTo"/>
-        <c:crossAx val="-2115901576"/>
+        <c:crossAx val="2107365256"/>
         <c:crosses val="autoZero"/>
         <c:auto val="1"/>
         <c:lblAlgn val="ctr"/>
@@ -362,7 +365,7 @@
         <c:noMultiLvlLbl val="0"/>
       </c:catAx>
       <c:valAx>
-        <c:axId val="-2115901576"/>
+        <c:axId val="2107365256"/>
         <c:scaling>
           <c:orientation val="minMax"/>
         </c:scaling>
@@ -378,7 +381,7 @@
             <a:noFill/>
           </a:ln>
         </c:spPr>
-        <c:crossAx val="-2118356776"/>
+        <c:crossAx val="2107362232"/>
         <c:crosses val="autoZero"/>
         <c:crossBetween val="between"/>
       </c:valAx>
@@ -589,7 +592,7 @@
           <a:p>
             <a:fld id="{E7A90B90-E472-474B-A3B5-1621A993C8E6}" type="datetimeFigureOut">
               <a:rPr lang="en-US" smtClean="0"/>
-              <a:t>3/1/14</a:t>
+              <a:t>3/21/14</a:t>
             </a:fld>
             <a:endParaRPr lang="en-US"/>
           </a:p>
@@ -759,7 +762,7 @@
           <a:p>
             <a:fld id="{E7A90B90-E472-474B-A3B5-1621A993C8E6}" type="datetimeFigureOut">
               <a:rPr lang="en-US" smtClean="0"/>
-              <a:t>3/1/14</a:t>
+              <a:t>3/21/14</a:t>
             </a:fld>
             <a:endParaRPr lang="en-US"/>
           </a:p>
@@ -939,7 +942,7 @@
           <a:p>
             <a:fld id="{E7A90B90-E472-474B-A3B5-1621A993C8E6}" type="datetimeFigureOut">
               <a:rPr lang="en-US" smtClean="0"/>
-              <a:t>3/1/14</a:t>
+              <a:t>3/21/14</a:t>
             </a:fld>
             <a:endParaRPr lang="en-US"/>
           </a:p>
@@ -1109,7 +1112,7 @@
           <a:p>
             <a:fld id="{E7A90B90-E472-474B-A3B5-1621A993C8E6}" type="datetimeFigureOut">
               <a:rPr lang="en-US" smtClean="0"/>
-              <a:t>3/1/14</a:t>
+              <a:t>3/21/14</a:t>
             </a:fld>
             <a:endParaRPr lang="en-US"/>
           </a:p>
@@ -1355,7 +1358,7 @@
           <a:p>
             <a:fld id="{E7A90B90-E472-474B-A3B5-1621A993C8E6}" type="datetimeFigureOut">
               <a:rPr lang="en-US" smtClean="0"/>
-              <a:t>3/1/14</a:t>
+              <a:t>3/21/14</a:t>
             </a:fld>
             <a:endParaRPr lang="en-US"/>
           </a:p>
@@ -1643,7 +1646,7 @@
           <a:p>
             <a:fld id="{E7A90B90-E472-474B-A3B5-1621A993C8E6}" type="datetimeFigureOut">
               <a:rPr lang="en-US" smtClean="0"/>
-              <a:t>3/1/14</a:t>
+              <a:t>3/21/14</a:t>
             </a:fld>
             <a:endParaRPr lang="en-US"/>
           </a:p>
@@ -2065,7 +2068,7 @@
           <a:p>
             <a:fld id="{E7A90B90-E472-474B-A3B5-1621A993C8E6}" type="datetimeFigureOut">
               <a:rPr lang="en-US" smtClean="0"/>
-              <a:t>3/1/14</a:t>
+              <a:t>3/21/14</a:t>
             </a:fld>
             <a:endParaRPr lang="en-US"/>
           </a:p>
@@ -2183,7 +2186,7 @@
           <a:p>
             <a:fld id="{E7A90B90-E472-474B-A3B5-1621A993C8E6}" type="datetimeFigureOut">
               <a:rPr lang="en-US" smtClean="0"/>
-              <a:t>3/1/14</a:t>
+              <a:t>3/21/14</a:t>
             </a:fld>
             <a:endParaRPr lang="en-US"/>
           </a:p>
@@ -2278,7 +2281,7 @@
           <a:p>
             <a:fld id="{E7A90B90-E472-474B-A3B5-1621A993C8E6}" type="datetimeFigureOut">
               <a:rPr lang="en-US" smtClean="0"/>
-              <a:t>3/1/14</a:t>
+              <a:t>3/21/14</a:t>
             </a:fld>
             <a:endParaRPr lang="en-US"/>
           </a:p>
@@ -2555,7 +2558,7 @@
           <a:p>
             <a:fld id="{E7A90B90-E472-474B-A3B5-1621A993C8E6}" type="datetimeFigureOut">
               <a:rPr lang="en-US" smtClean="0"/>
-              <a:t>3/1/14</a:t>
+              <a:t>3/21/14</a:t>
             </a:fld>
             <a:endParaRPr lang="en-US"/>
           </a:p>
@@ -2808,7 +2811,7 @@
           <a:p>
             <a:fld id="{E7A90B90-E472-474B-A3B5-1621A993C8E6}" type="datetimeFigureOut">
               <a:rPr lang="en-US" smtClean="0"/>
-              <a:t>3/1/14</a:t>
+              <a:t>3/21/14</a:t>
             </a:fld>
             <a:endParaRPr lang="en-US"/>
           </a:p>
@@ -3021,7 +3024,7 @@
           <a:p>
             <a:fld id="{E7A90B90-E472-474B-A3B5-1621A993C8E6}" type="datetimeFigureOut">
               <a:rPr lang="en-US" smtClean="0"/>
-              <a:t>3/1/14</a:t>
+              <a:t>3/21/14</a:t>
             </a:fld>
             <a:endParaRPr lang="en-US"/>
           </a:p>
@@ -3486,6 +3489,270 @@
     <p:extLst>
       <p:ext uri="{BB962C8B-B14F-4D97-AF65-F5344CB8AC3E}">
         <p14:creationId xmlns:p14="http://schemas.microsoft.com/office/powerpoint/2010/main" val="310984695"/>
+      </p:ext>
+    </p:extLst>
+  </p:cSld>
+  <p:clrMapOvr>
+    <a:masterClrMapping/>
+  </p:clrMapOvr>
+</p:sld>
+</file>
+
+<file path=ppt/slides/slide10.xml><?xml version="1.0" encoding="utf-8"?>
+<p:sld xmlns:a="http://schemas.openxmlformats.org/drawingml/2006/main" xmlns:r="http://schemas.openxmlformats.org/officeDocument/2006/relationships" xmlns:p="http://schemas.openxmlformats.org/presentationml/2006/main">
+  <p:cSld>
+    <p:spTree>
+      <p:nvGrpSpPr>
+        <p:cNvPr id="1" name=""/>
+        <p:cNvGrpSpPr/>
+        <p:nvPr/>
+      </p:nvGrpSpPr>
+      <p:grpSpPr>
+        <a:xfrm>
+          <a:off x="0" y="0"/>
+          <a:ext cx="0" cy="0"/>
+          <a:chOff x="0" y="0"/>
+          <a:chExt cx="0" cy="0"/>
+        </a:xfrm>
+      </p:grpSpPr>
+      <p:sp>
+        <p:nvSpPr>
+          <p:cNvPr id="2" name="Title 1"/>
+          <p:cNvSpPr>
+            <a:spLocks noGrp="1"/>
+          </p:cNvSpPr>
+          <p:nvPr>
+            <p:ph type="title"/>
+          </p:nvPr>
+        </p:nvSpPr>
+        <p:spPr/>
+        <p:txBody>
+          <a:bodyPr/>
+          <a:lstStyle/>
+          <a:p>
+            <a:r>
+              <a:rPr lang="en-US" dirty="0" smtClean="0"/>
+              <a:t>Tenth slide	</a:t>
+            </a:r>
+            <a:endParaRPr lang="en-US" dirty="0"/>
+          </a:p>
+        </p:txBody>
+      </p:sp>
+      <p:sp>
+        <p:nvSpPr>
+          <p:cNvPr id="3" name="Content Placeholder 2"/>
+          <p:cNvSpPr>
+            <a:spLocks noGrp="1"/>
+          </p:cNvSpPr>
+          <p:nvPr>
+            <p:ph idx="1"/>
+          </p:nvPr>
+        </p:nvSpPr>
+        <p:spPr/>
+        <p:txBody>
+          <a:bodyPr/>
+          <a:lstStyle/>
+          <a:p>
+            <a:r>
+              <a:rPr lang="en-US" dirty="0" smtClean="0"/>
+              <a:t>Bullet 1</a:t>
+            </a:r>
+          </a:p>
+          <a:p>
+            <a:r>
+              <a:rPr lang="en-US" dirty="0" smtClean="0"/>
+              <a:t>Bullet 2</a:t>
+            </a:r>
+          </a:p>
+          <a:p>
+            <a:r>
+              <a:rPr lang="en-US" dirty="0" smtClean="0"/>
+              <a:t>Bullet 3</a:t>
+            </a:r>
+            <a:endParaRPr lang="en-US" dirty="0"/>
+          </a:p>
+        </p:txBody>
+      </p:sp>
+    </p:spTree>
+    <p:extLst>
+      <p:ext uri="{BB962C8B-B14F-4D97-AF65-F5344CB8AC3E}">
+        <p14:creationId xmlns:p14="http://schemas.microsoft.com/office/powerpoint/2010/main" val="4190479336"/>
+      </p:ext>
+    </p:extLst>
+  </p:cSld>
+  <p:clrMapOvr>
+    <a:masterClrMapping/>
+  </p:clrMapOvr>
+</p:sld>
+</file>
+
+<file path=ppt/slides/slide11.xml><?xml version="1.0" encoding="utf-8"?>
+<p:sld xmlns:a="http://schemas.openxmlformats.org/drawingml/2006/main" xmlns:r="http://schemas.openxmlformats.org/officeDocument/2006/relationships" xmlns:p="http://schemas.openxmlformats.org/presentationml/2006/main">
+  <p:cSld>
+    <p:spTree>
+      <p:nvGrpSpPr>
+        <p:cNvPr id="1" name=""/>
+        <p:cNvGrpSpPr/>
+        <p:nvPr/>
+      </p:nvGrpSpPr>
+      <p:grpSpPr>
+        <a:xfrm>
+          <a:off x="0" y="0"/>
+          <a:ext cx="0" cy="0"/>
+          <a:chOff x="0" y="0"/>
+          <a:chExt cx="0" cy="0"/>
+        </a:xfrm>
+      </p:grpSpPr>
+      <p:sp>
+        <p:nvSpPr>
+          <p:cNvPr id="2" name="Title 1"/>
+          <p:cNvSpPr>
+            <a:spLocks noGrp="1"/>
+          </p:cNvSpPr>
+          <p:nvPr>
+            <p:ph type="title"/>
+          </p:nvPr>
+        </p:nvSpPr>
+        <p:spPr/>
+        <p:txBody>
+          <a:bodyPr/>
+          <a:lstStyle/>
+          <a:p>
+            <a:r>
+              <a:rPr lang="en-US" dirty="0" smtClean="0"/>
+              <a:t>Eleventh slide</a:t>
+            </a:r>
+            <a:endParaRPr lang="en-US" dirty="0"/>
+          </a:p>
+        </p:txBody>
+      </p:sp>
+      <p:sp>
+        <p:nvSpPr>
+          <p:cNvPr id="3" name="Content Placeholder 2"/>
+          <p:cNvSpPr>
+            <a:spLocks noGrp="1"/>
+          </p:cNvSpPr>
+          <p:nvPr>
+            <p:ph idx="1"/>
+          </p:nvPr>
+        </p:nvSpPr>
+        <p:spPr/>
+        <p:txBody>
+          <a:bodyPr/>
+          <a:lstStyle/>
+          <a:p>
+            <a:r>
+              <a:rPr lang="en-US" dirty="0" smtClean="0"/>
+              <a:t>Should be slides[10]</a:t>
+            </a:r>
+            <a:endParaRPr lang="en-US" dirty="0"/>
+          </a:p>
+        </p:txBody>
+      </p:sp>
+    </p:spTree>
+    <p:extLst>
+      <p:ext uri="{BB962C8B-B14F-4D97-AF65-F5344CB8AC3E}">
+        <p14:creationId xmlns:p14="http://schemas.microsoft.com/office/powerpoint/2010/main" val="1988547402"/>
+      </p:ext>
+    </p:extLst>
+  </p:cSld>
+  <p:clrMapOvr>
+    <a:masterClrMapping/>
+  </p:clrMapOvr>
+</p:sld>
+</file>
+
+<file path=ppt/slides/slide12.xml><?xml version="1.0" encoding="utf-8"?>
+<p:sld xmlns:a="http://schemas.openxmlformats.org/drawingml/2006/main" xmlns:r="http://schemas.openxmlformats.org/officeDocument/2006/relationships" xmlns:p="http://schemas.openxmlformats.org/presentationml/2006/main">
+  <p:cSld>
+    <p:spTree>
+      <p:nvGrpSpPr>
+        <p:cNvPr id="1" name=""/>
+        <p:cNvGrpSpPr/>
+        <p:nvPr/>
+      </p:nvGrpSpPr>
+      <p:grpSpPr>
+        <a:xfrm>
+          <a:off x="0" y="0"/>
+          <a:ext cx="0" cy="0"/>
+          <a:chOff x="0" y="0"/>
+          <a:chExt cx="0" cy="0"/>
+        </a:xfrm>
+      </p:grpSpPr>
+      <p:sp>
+        <p:nvSpPr>
+          <p:cNvPr id="2" name="Title 1"/>
+          <p:cNvSpPr>
+            <a:spLocks noGrp="1"/>
+          </p:cNvSpPr>
+          <p:nvPr>
+            <p:ph type="title"/>
+          </p:nvPr>
+        </p:nvSpPr>
+        <p:spPr/>
+        <p:txBody>
+          <a:bodyPr/>
+          <a:lstStyle/>
+          <a:p>
+            <a:r>
+              <a:rPr lang="en-US" dirty="0" smtClean="0"/>
+              <a:t>12</a:t>
+            </a:r>
+            <a:r>
+              <a:rPr lang="en-US" baseline="30000" dirty="0" smtClean="0"/>
+              <a:t>th</a:t>
+            </a:r>
+            <a:r>
+              <a:rPr lang="en-US" dirty="0" smtClean="0"/>
+              <a:t> slide!</a:t>
+            </a:r>
+            <a:endParaRPr lang="en-US" dirty="0"/>
+          </a:p>
+        </p:txBody>
+      </p:sp>
+      <p:sp>
+        <p:nvSpPr>
+          <p:cNvPr id="3" name="Content Placeholder 2"/>
+          <p:cNvSpPr>
+            <a:spLocks noGrp="1"/>
+          </p:cNvSpPr>
+          <p:nvPr>
+            <p:ph idx="1"/>
+          </p:nvPr>
+        </p:nvSpPr>
+        <p:spPr/>
+        <p:txBody>
+          <a:bodyPr/>
+          <a:lstStyle/>
+          <a:p>
+            <a:r>
+              <a:rPr lang="en-US" dirty="0" smtClean="0"/>
+              <a:t>Stuff</a:t>
+            </a:r>
+          </a:p>
+          <a:p>
+            <a:r>
+              <a:rPr lang="en-US" dirty="0" smtClean="0"/>
+              <a:t>More stuff</a:t>
+            </a:r>
+          </a:p>
+          <a:p>
+            <a:r>
+              <a:rPr lang="en-US" dirty="0" smtClean="0"/>
+              <a:t>Stuffy </a:t>
+            </a:r>
+            <a:r>
+              <a:rPr lang="en-US" smtClean="0"/>
+              <a:t>stuffy stuff</a:t>
+            </a:r>
+            <a:endParaRPr lang="en-US"/>
+          </a:p>
+        </p:txBody>
+      </p:sp>
+    </p:spTree>
+    <p:extLst>
+      <p:ext uri="{BB962C8B-B14F-4D97-AF65-F5344CB8AC3E}">
+        <p14:creationId xmlns:p14="http://schemas.microsoft.com/office/powerpoint/2010/main" val="3252941537"/>
       </p:ext>
     </p:extLst>
   </p:cSld>

</xml_diff>